<commit_message>
update lec1 pptx and gitignore
</commit_message>
<xml_diff>
--- a/1. Введение/1. Введение.pptx
+++ b/1. Введение/1. Введение.pptx
@@ -5,7 +5,7 @@
     <p:sldMasterId id="2147483648" r:id="rId1"/>
   </p:sldMasterIdLst>
   <p:notesMasterIdLst>
-    <p:notesMasterId r:id="rId13"/>
+    <p:notesMasterId r:id="rId14"/>
   </p:notesMasterIdLst>
   <p:sldIdLst>
     <p:sldId id="257" r:id="rId2"/>
@@ -14,11 +14,12 @@
     <p:sldId id="260" r:id="rId5"/>
     <p:sldId id="263" r:id="rId6"/>
     <p:sldId id="266" r:id="rId7"/>
-    <p:sldId id="265" r:id="rId8"/>
-    <p:sldId id="267" r:id="rId9"/>
-    <p:sldId id="261" r:id="rId10"/>
-    <p:sldId id="268" r:id="rId11"/>
-    <p:sldId id="262" r:id="rId12"/>
+    <p:sldId id="269" r:id="rId8"/>
+    <p:sldId id="265" r:id="rId9"/>
+    <p:sldId id="267" r:id="rId10"/>
+    <p:sldId id="261" r:id="rId11"/>
+    <p:sldId id="268" r:id="rId12"/>
+    <p:sldId id="262" r:id="rId13"/>
   </p:sldIdLst>
   <p:sldSz cx="9144000" cy="6858000" type="screen4x3"/>
   <p:notesSz cx="6858000" cy="9144000"/>
@@ -566,7 +567,7 @@
           <a:p>
             <a:fld id="{46D2654B-16AF-4FC8-85F1-09ECDEE7574F}" type="slidenum">
               <a:rPr lang="ru-RU" smtClean="0"/>
-              <a:t>8</a:t>
+              <a:t>9</a:t>
             </a:fld>
             <a:endParaRPr lang="ru-RU"/>
           </a:p>
@@ -4085,6 +4086,270 @@
           <a:chExt cx="0" cy="0"/>
         </a:xfrm>
       </p:grpSpPr>
+      <p:sp>
+        <p:nvSpPr>
+          <p:cNvPr id="3" name="Объект 2">
+            <a:extLst>
+              <a:ext uri="{FF2B5EF4-FFF2-40B4-BE49-F238E27FC236}">
+                <a16:creationId xmlns:a16="http://schemas.microsoft.com/office/drawing/2014/main" id="{E9C4299B-64F1-CAB8-08A0-4F46371C2658}"/>
+              </a:ext>
+            </a:extLst>
+          </p:cNvPr>
+          <p:cNvSpPr>
+            <a:spLocks noGrp="1"/>
+          </p:cNvSpPr>
+          <p:nvPr>
+            <p:ph idx="1"/>
+          </p:nvPr>
+        </p:nvSpPr>
+        <p:spPr>
+          <a:xfrm>
+            <a:off x="256674" y="855077"/>
+            <a:ext cx="7886700" cy="461665"/>
+          </a:xfrm>
+        </p:spPr>
+        <p:txBody>
+          <a:bodyPr>
+            <a:normAutofit fontScale="55000" lnSpcReduction="20000"/>
+          </a:bodyPr>
+          <a:lstStyle/>
+          <a:p>
+            <a:pPr marL="0" indent="0">
+              <a:buNone/>
+            </a:pPr>
+            <a:r>
+              <a:rPr lang="en-US" dirty="0">
+                <a:hlinkClick r:id="rId2"/>
+              </a:rPr>
+              <a:t>https://wiki.freepascal.org/Basic_Pascal_Tutorial/Chapter_1/Variables_and_Data_Types</a:t>
+            </a:r>
+            <a:endParaRPr lang="ru-RU" dirty="0">
+              <a:hlinkClick r:id="rId2"/>
+            </a:endParaRPr>
+          </a:p>
+          <a:p>
+            <a:pPr marL="0" indent="0">
+              <a:buNone/>
+            </a:pPr>
+            <a:r>
+              <a:rPr lang="en-US" dirty="0">
+                <a:hlinkClick r:id="rId2"/>
+              </a:rPr>
+              <a:t>https://www.tutorialspoint.com/pascal/pascal_variable_types.htm</a:t>
+            </a:r>
+            <a:endParaRPr lang="en-US" dirty="0"/>
+          </a:p>
+          <a:p>
+            <a:pPr marL="0" indent="0">
+              <a:buNone/>
+            </a:pPr>
+            <a:endParaRPr lang="ru-RU" dirty="0"/>
+          </a:p>
+        </p:txBody>
+      </p:sp>
+      <p:sp>
+        <p:nvSpPr>
+          <p:cNvPr id="4" name="TextBox 3">
+            <a:extLst>
+              <a:ext uri="{FF2B5EF4-FFF2-40B4-BE49-F238E27FC236}">
+                <a16:creationId xmlns:a16="http://schemas.microsoft.com/office/drawing/2014/main" id="{701CF149-D8F4-A759-2FF1-482A3E3B75A7}"/>
+              </a:ext>
+            </a:extLst>
+          </p:cNvPr>
+          <p:cNvSpPr txBox="1"/>
+          <p:nvPr/>
+        </p:nvSpPr>
+        <p:spPr>
+          <a:xfrm>
+            <a:off x="256674" y="160421"/>
+            <a:ext cx="2010487" cy="461665"/>
+          </a:xfrm>
+          <a:prstGeom prst="rect">
+            <a:avLst/>
+          </a:prstGeom>
+          <a:noFill/>
+        </p:spPr>
+        <p:txBody>
+          <a:bodyPr wrap="none" rtlCol="0">
+            <a:spAutoFit/>
+          </a:bodyPr>
+          <a:lstStyle/>
+          <a:p>
+            <a:r>
+              <a:rPr lang="ru-RU" sz="2400" dirty="0">
+                <a:effectLst/>
+                <a:latin typeface="Calibri" panose="020F0502020204030204" pitchFamily="34" charset="0"/>
+                <a:ea typeface="Calibri" panose="020F0502020204030204" pitchFamily="34" charset="0"/>
+                <a:cs typeface="Times New Roman" panose="02020603050405020304" pitchFamily="18" charset="0"/>
+              </a:rPr>
+              <a:t>Список типов.</a:t>
+            </a:r>
+            <a:endParaRPr lang="ru-RU" sz="2400" dirty="0"/>
+          </a:p>
+        </p:txBody>
+      </p:sp>
+      <p:pic>
+        <p:nvPicPr>
+          <p:cNvPr id="8" name="Рисунок 7">
+            <a:extLst>
+              <a:ext uri="{FF2B5EF4-FFF2-40B4-BE49-F238E27FC236}">
+                <a16:creationId xmlns:a16="http://schemas.microsoft.com/office/drawing/2014/main" id="{F49BBE62-C005-7792-83F2-621D84F04EA6}"/>
+              </a:ext>
+            </a:extLst>
+          </p:cNvPr>
+          <p:cNvPicPr>
+            <a:picLocks noChangeAspect="1"/>
+          </p:cNvPicPr>
+          <p:nvPr/>
+        </p:nvPicPr>
+        <p:blipFill>
+          <a:blip r:embed="rId3"/>
+          <a:stretch>
+            <a:fillRect/>
+          </a:stretch>
+        </p:blipFill>
+        <p:spPr>
+          <a:xfrm>
+            <a:off x="327109" y="1471863"/>
+            <a:ext cx="3933825" cy="3048000"/>
+          </a:xfrm>
+          <a:prstGeom prst="rect">
+            <a:avLst/>
+          </a:prstGeom>
+        </p:spPr>
+      </p:pic>
+      <p:pic>
+        <p:nvPicPr>
+          <p:cNvPr id="12" name="Рисунок 11">
+            <a:extLst>
+              <a:ext uri="{FF2B5EF4-FFF2-40B4-BE49-F238E27FC236}">
+                <a16:creationId xmlns:a16="http://schemas.microsoft.com/office/drawing/2014/main" id="{120DCBDA-B439-D9A7-DD35-AFE8B7A4B013}"/>
+              </a:ext>
+            </a:extLst>
+          </p:cNvPr>
+          <p:cNvPicPr>
+            <a:picLocks noChangeAspect="1"/>
+          </p:cNvPicPr>
+          <p:nvPr/>
+        </p:nvPicPr>
+        <p:blipFill>
+          <a:blip r:embed="rId4"/>
+          <a:stretch>
+            <a:fillRect/>
+          </a:stretch>
+        </p:blipFill>
+        <p:spPr>
+          <a:xfrm>
+            <a:off x="327109" y="4674984"/>
+            <a:ext cx="2200275" cy="1647825"/>
+          </a:xfrm>
+          <a:prstGeom prst="rect">
+            <a:avLst/>
+          </a:prstGeom>
+        </p:spPr>
+      </p:pic>
+      <p:pic>
+        <p:nvPicPr>
+          <p:cNvPr id="14" name="Рисунок 13">
+            <a:extLst>
+              <a:ext uri="{FF2B5EF4-FFF2-40B4-BE49-F238E27FC236}">
+                <a16:creationId xmlns:a16="http://schemas.microsoft.com/office/drawing/2014/main" id="{C85E162D-A508-FE81-F6AE-38B61DF3F0D5}"/>
+              </a:ext>
+            </a:extLst>
+          </p:cNvPr>
+          <p:cNvPicPr>
+            <a:picLocks noChangeAspect="1"/>
+          </p:cNvPicPr>
+          <p:nvPr/>
+        </p:nvPicPr>
+        <p:blipFill>
+          <a:blip r:embed="rId5"/>
+          <a:stretch>
+            <a:fillRect/>
+          </a:stretch>
+        </p:blipFill>
+        <p:spPr>
+          <a:xfrm>
+            <a:off x="4338637" y="1471863"/>
+            <a:ext cx="4733925" cy="2266950"/>
+          </a:xfrm>
+          <a:prstGeom prst="rect">
+            <a:avLst/>
+          </a:prstGeom>
+        </p:spPr>
+      </p:pic>
+      <p:sp>
+        <p:nvSpPr>
+          <p:cNvPr id="15" name="Номер слайда 1">
+            <a:extLst>
+              <a:ext uri="{FF2B5EF4-FFF2-40B4-BE49-F238E27FC236}">
+                <a16:creationId xmlns:a16="http://schemas.microsoft.com/office/drawing/2014/main" id="{A04C37F0-B3B5-3C98-F85A-7D61B64676FA}"/>
+              </a:ext>
+            </a:extLst>
+          </p:cNvPr>
+          <p:cNvSpPr>
+            <a:spLocks noGrp="1"/>
+          </p:cNvSpPr>
+          <p:nvPr>
+            <p:ph type="sldNum" sz="quarter" idx="12"/>
+          </p:nvPr>
+        </p:nvSpPr>
+        <p:spPr>
+          <a:xfrm>
+            <a:off x="6457950" y="6362616"/>
+            <a:ext cx="2057400" cy="365125"/>
+          </a:xfrm>
+        </p:spPr>
+        <p:txBody>
+          <a:bodyPr/>
+          <a:lstStyle/>
+          <a:p>
+            <a:fld id="{370A62FE-C268-428B-9FB6-A45FCBA79971}" type="slidenum">
+              <a:rPr lang="ru-RU" sz="1400" smtClean="0">
+                <a:solidFill>
+                  <a:schemeClr val="tx1"/>
+                </a:solidFill>
+              </a:rPr>
+              <a:t>10</a:t>
+            </a:fld>
+            <a:endParaRPr lang="ru-RU" dirty="0">
+              <a:solidFill>
+                <a:schemeClr val="tx1"/>
+              </a:solidFill>
+            </a:endParaRPr>
+          </a:p>
+        </p:txBody>
+      </p:sp>
+    </p:spTree>
+    <p:extLst>
+      <p:ext uri="{BB962C8B-B14F-4D97-AF65-F5344CB8AC3E}">
+        <p14:creationId xmlns:p14="http://schemas.microsoft.com/office/powerpoint/2010/main" val="3005760833"/>
+      </p:ext>
+    </p:extLst>
+  </p:cSld>
+  <p:clrMapOvr>
+    <a:masterClrMapping/>
+  </p:clrMapOvr>
+</p:sld>
+</file>
+
+<file path=ppt/slides/slide11.xml><?xml version="1.0" encoding="utf-8"?>
+<p:sld xmlns:a="http://schemas.openxmlformats.org/drawingml/2006/main" xmlns:r="http://schemas.openxmlformats.org/officeDocument/2006/relationships" xmlns:p="http://schemas.openxmlformats.org/presentationml/2006/main">
+  <p:cSld>
+    <p:spTree>
+      <p:nvGrpSpPr>
+        <p:cNvPr id="1" name=""/>
+        <p:cNvGrpSpPr/>
+        <p:nvPr/>
+      </p:nvGrpSpPr>
+      <p:grpSpPr>
+        <a:xfrm>
+          <a:off x="0" y="0"/>
+          <a:ext cx="0" cy="0"/>
+          <a:chOff x="0" y="0"/>
+          <a:chExt cx="0" cy="0"/>
+        </a:xfrm>
+      </p:grpSpPr>
       <p:grpSp>
         <p:nvGrpSpPr>
           <p:cNvPr id="6" name="Группа 5">
@@ -7369,6 +7634,48 @@
           </a:p>
         </p:txBody>
       </p:sp>
+      <p:sp>
+        <p:nvSpPr>
+          <p:cNvPr id="2" name="Номер слайда 1">
+            <a:extLst>
+              <a:ext uri="{FF2B5EF4-FFF2-40B4-BE49-F238E27FC236}">
+                <a16:creationId xmlns:a16="http://schemas.microsoft.com/office/drawing/2014/main" id="{20D80245-C4AD-A15C-B3BD-BCFCF6474AD6}"/>
+              </a:ext>
+            </a:extLst>
+          </p:cNvPr>
+          <p:cNvSpPr>
+            <a:spLocks noGrp="1"/>
+          </p:cNvSpPr>
+          <p:nvPr>
+            <p:ph type="sldNum" sz="quarter" idx="12"/>
+          </p:nvPr>
+        </p:nvSpPr>
+        <p:spPr>
+          <a:xfrm>
+            <a:off x="6457950" y="6362616"/>
+            <a:ext cx="2057400" cy="365125"/>
+          </a:xfrm>
+        </p:spPr>
+        <p:txBody>
+          <a:bodyPr/>
+          <a:lstStyle/>
+          <a:p>
+            <a:fld id="{370A62FE-C268-428B-9FB6-A45FCBA79971}" type="slidenum">
+              <a:rPr lang="ru-RU" sz="1400" smtClean="0">
+                <a:solidFill>
+                  <a:schemeClr val="tx1"/>
+                </a:solidFill>
+              </a:rPr>
+              <a:t>11</a:t>
+            </a:fld>
+            <a:endParaRPr lang="ru-RU" dirty="0">
+              <a:solidFill>
+                <a:schemeClr val="tx1"/>
+              </a:solidFill>
+            </a:endParaRPr>
+          </a:p>
+        </p:txBody>
+      </p:sp>
     </p:spTree>
     <p:extLst>
       <p:ext uri="{BB962C8B-B14F-4D97-AF65-F5344CB8AC3E}">
@@ -7382,7 +7689,7 @@
 </p:sld>
 </file>
 
-<file path=ppt/slides/slide11.xml><?xml version="1.0" encoding="utf-8"?>
+<file path=ppt/slides/slide12.xml><?xml version="1.0" encoding="utf-8"?>
 <p:sld xmlns:a="http://schemas.openxmlformats.org/drawingml/2006/main" xmlns:r="http://schemas.openxmlformats.org/officeDocument/2006/relationships" xmlns:p="http://schemas.openxmlformats.org/presentationml/2006/main">
   <p:cSld>
     <p:spTree>
@@ -7648,7 +7955,7 @@
                   <a:schemeClr val="tx1"/>
                 </a:solidFill>
               </a:rPr>
-              <a:t>11</a:t>
+              <a:t>12</a:t>
             </a:fld>
             <a:endParaRPr lang="ru-RU" dirty="0">
               <a:solidFill>
@@ -8823,6 +9130,48 @@
           </a:p>
         </p:txBody>
       </p:sp>
+      <p:sp>
+        <p:nvSpPr>
+          <p:cNvPr id="3" name="Номер слайда 1">
+            <a:extLst>
+              <a:ext uri="{FF2B5EF4-FFF2-40B4-BE49-F238E27FC236}">
+                <a16:creationId xmlns:a16="http://schemas.microsoft.com/office/drawing/2014/main" id="{5595ADE5-75B9-4E45-2520-57F55D47B12F}"/>
+              </a:ext>
+            </a:extLst>
+          </p:cNvPr>
+          <p:cNvSpPr>
+            <a:spLocks noGrp="1"/>
+          </p:cNvSpPr>
+          <p:nvPr>
+            <p:ph type="sldNum" sz="quarter" idx="12"/>
+          </p:nvPr>
+        </p:nvSpPr>
+        <p:spPr>
+          <a:xfrm>
+            <a:off x="6457950" y="6362616"/>
+            <a:ext cx="2057400" cy="365125"/>
+          </a:xfrm>
+        </p:spPr>
+        <p:txBody>
+          <a:bodyPr/>
+          <a:lstStyle/>
+          <a:p>
+            <a:fld id="{370A62FE-C268-428B-9FB6-A45FCBA79971}" type="slidenum">
+              <a:rPr lang="ru-RU" sz="1400" smtClean="0">
+                <a:solidFill>
+                  <a:schemeClr val="tx1"/>
+                </a:solidFill>
+              </a:rPr>
+              <a:t>6</a:t>
+            </a:fld>
+            <a:endParaRPr lang="ru-RU" dirty="0">
+              <a:solidFill>
+                <a:schemeClr val="tx1"/>
+              </a:solidFill>
+            </a:endParaRPr>
+          </a:p>
+        </p:txBody>
+      </p:sp>
     </p:spTree>
     <p:extLst>
       <p:ext uri="{BB962C8B-B14F-4D97-AF65-F5344CB8AC3E}">
@@ -8853,6 +9202,152 @@
           <a:chExt cx="0" cy="0"/>
         </a:xfrm>
       </p:grpSpPr>
+      <p:sp>
+        <p:nvSpPr>
+          <p:cNvPr id="4" name="Номер слайда 1">
+            <a:extLst>
+              <a:ext uri="{FF2B5EF4-FFF2-40B4-BE49-F238E27FC236}">
+                <a16:creationId xmlns:a16="http://schemas.microsoft.com/office/drawing/2014/main" id="{B26E9613-9AC6-DA1C-7FAA-5D1714C7A357}"/>
+              </a:ext>
+            </a:extLst>
+          </p:cNvPr>
+          <p:cNvSpPr>
+            <a:spLocks noGrp="1"/>
+          </p:cNvSpPr>
+          <p:nvPr>
+            <p:ph type="sldNum" sz="quarter" idx="12"/>
+          </p:nvPr>
+        </p:nvSpPr>
+        <p:spPr>
+          <a:xfrm>
+            <a:off x="6457950" y="6362616"/>
+            <a:ext cx="2057400" cy="365125"/>
+          </a:xfrm>
+        </p:spPr>
+        <p:txBody>
+          <a:bodyPr/>
+          <a:lstStyle/>
+          <a:p>
+            <a:fld id="{370A62FE-C268-428B-9FB6-A45FCBA79971}" type="slidenum">
+              <a:rPr lang="ru-RU" sz="1400" smtClean="0">
+                <a:solidFill>
+                  <a:schemeClr val="tx1"/>
+                </a:solidFill>
+              </a:rPr>
+              <a:t>7</a:t>
+            </a:fld>
+            <a:endParaRPr lang="ru-RU" dirty="0">
+              <a:solidFill>
+                <a:schemeClr val="tx1"/>
+              </a:solidFill>
+            </a:endParaRPr>
+          </a:p>
+        </p:txBody>
+      </p:sp>
+      <p:sp>
+        <p:nvSpPr>
+          <p:cNvPr id="5" name="TextBox 4">
+            <a:extLst>
+              <a:ext uri="{FF2B5EF4-FFF2-40B4-BE49-F238E27FC236}">
+                <a16:creationId xmlns:a16="http://schemas.microsoft.com/office/drawing/2014/main" id="{1E69466C-9302-BAFA-3398-304210C8AE26}"/>
+              </a:ext>
+            </a:extLst>
+          </p:cNvPr>
+          <p:cNvSpPr txBox="1"/>
+          <p:nvPr/>
+        </p:nvSpPr>
+        <p:spPr>
+          <a:xfrm>
+            <a:off x="256674" y="160421"/>
+            <a:ext cx="1698222" cy="461665"/>
+          </a:xfrm>
+          <a:prstGeom prst="rect">
+            <a:avLst/>
+          </a:prstGeom>
+          <a:noFill/>
+        </p:spPr>
+        <p:txBody>
+          <a:bodyPr wrap="none" rtlCol="0">
+            <a:spAutoFit/>
+          </a:bodyPr>
+          <a:lstStyle/>
+          <a:p>
+            <a:r>
+              <a:rPr lang="en-US" sz="2400" dirty="0">
+                <a:effectLst/>
+                <a:latin typeface="Calibri" panose="020F0502020204030204" pitchFamily="34" charset="0"/>
+                <a:ea typeface="Calibri" panose="020F0502020204030204" pitchFamily="34" charset="0"/>
+                <a:cs typeface="Times New Roman" panose="02020603050405020304" pitchFamily="18" charset="0"/>
+              </a:rPr>
+              <a:t>Hello world</a:t>
+            </a:r>
+            <a:r>
+              <a:rPr lang="ru-RU" sz="2400" dirty="0"/>
+              <a:t>.</a:t>
+            </a:r>
+          </a:p>
+        </p:txBody>
+      </p:sp>
+      <p:pic>
+        <p:nvPicPr>
+          <p:cNvPr id="6" name="Рисунок 5">
+            <a:extLst>
+              <a:ext uri="{FF2B5EF4-FFF2-40B4-BE49-F238E27FC236}">
+                <a16:creationId xmlns:a16="http://schemas.microsoft.com/office/drawing/2014/main" id="{C45FF518-8FB8-A78D-F626-7CFC5942845D}"/>
+              </a:ext>
+            </a:extLst>
+          </p:cNvPr>
+          <p:cNvPicPr>
+            <a:picLocks noChangeAspect="1"/>
+          </p:cNvPicPr>
+          <p:nvPr/>
+        </p:nvPicPr>
+        <p:blipFill>
+          <a:blip r:embed="rId2"/>
+          <a:stretch>
+            <a:fillRect/>
+          </a:stretch>
+        </p:blipFill>
+        <p:spPr>
+          <a:xfrm>
+            <a:off x="681205" y="992341"/>
+            <a:ext cx="7834145" cy="4177364"/>
+          </a:xfrm>
+          <a:prstGeom prst="rect">
+            <a:avLst/>
+          </a:prstGeom>
+        </p:spPr>
+      </p:pic>
+    </p:spTree>
+    <p:extLst>
+      <p:ext uri="{BB962C8B-B14F-4D97-AF65-F5344CB8AC3E}">
+        <p14:creationId xmlns:p14="http://schemas.microsoft.com/office/powerpoint/2010/main" val="121956756"/>
+      </p:ext>
+    </p:extLst>
+  </p:cSld>
+  <p:clrMapOvr>
+    <a:masterClrMapping/>
+  </p:clrMapOvr>
+</p:sld>
+</file>
+
+<file path=ppt/slides/slide8.xml><?xml version="1.0" encoding="utf-8"?>
+<p:sld xmlns:a="http://schemas.openxmlformats.org/drawingml/2006/main" xmlns:r="http://schemas.openxmlformats.org/officeDocument/2006/relationships" xmlns:p="http://schemas.openxmlformats.org/presentationml/2006/main">
+  <p:cSld>
+    <p:spTree>
+      <p:nvGrpSpPr>
+        <p:cNvPr id="1" name=""/>
+        <p:cNvGrpSpPr/>
+        <p:nvPr/>
+      </p:nvGrpSpPr>
+      <p:grpSpPr>
+        <a:xfrm>
+          <a:off x="0" y="0"/>
+          <a:ext cx="0" cy="0"/>
+          <a:chOff x="0" y="0"/>
+          <a:chExt cx="0" cy="0"/>
+        </a:xfrm>
+      </p:grpSpPr>
       <p:pic>
         <p:nvPicPr>
           <p:cNvPr id="2054" name="Picture 6">
@@ -8970,7 +9465,7 @@
                   <a:schemeClr val="tx1"/>
                 </a:solidFill>
               </a:rPr>
-              <a:t>7</a:t>
+              <a:t>8</a:t>
             </a:fld>
             <a:endParaRPr lang="ru-RU" dirty="0">
               <a:solidFill>
@@ -9028,7 +9523,7 @@
 </p:sld>
 </file>
 
-<file path=ppt/slides/slide8.xml><?xml version="1.0" encoding="utf-8"?>
+<file path=ppt/slides/slide9.xml><?xml version="1.0" encoding="utf-8"?>
 <p:sld xmlns:a="http://schemas.openxmlformats.org/drawingml/2006/main" xmlns:r="http://schemas.openxmlformats.org/officeDocument/2006/relationships" xmlns:p="http://schemas.openxmlformats.org/presentationml/2006/main">
   <p:cSld>
     <p:spTree>
@@ -9212,7 +9707,7 @@
                   <a:schemeClr val="tx1"/>
                 </a:solidFill>
               </a:rPr>
-              <a:t>8</a:t>
+              <a:t>9</a:t>
             </a:fld>
             <a:endParaRPr lang="ru-RU" dirty="0">
               <a:solidFill>
@@ -9410,270 +9905,6 @@
       <p:bldP spid="7" grpId="0" animBg="1"/>
     </p:bldLst>
   </p:timing>
-</p:sld>
-</file>
-
-<file path=ppt/slides/slide9.xml><?xml version="1.0" encoding="utf-8"?>
-<p:sld xmlns:a="http://schemas.openxmlformats.org/drawingml/2006/main" xmlns:r="http://schemas.openxmlformats.org/officeDocument/2006/relationships" xmlns:p="http://schemas.openxmlformats.org/presentationml/2006/main">
-  <p:cSld>
-    <p:spTree>
-      <p:nvGrpSpPr>
-        <p:cNvPr id="1" name=""/>
-        <p:cNvGrpSpPr/>
-        <p:nvPr/>
-      </p:nvGrpSpPr>
-      <p:grpSpPr>
-        <a:xfrm>
-          <a:off x="0" y="0"/>
-          <a:ext cx="0" cy="0"/>
-          <a:chOff x="0" y="0"/>
-          <a:chExt cx="0" cy="0"/>
-        </a:xfrm>
-      </p:grpSpPr>
-      <p:sp>
-        <p:nvSpPr>
-          <p:cNvPr id="3" name="Объект 2">
-            <a:extLst>
-              <a:ext uri="{FF2B5EF4-FFF2-40B4-BE49-F238E27FC236}">
-                <a16:creationId xmlns:a16="http://schemas.microsoft.com/office/drawing/2014/main" id="{E9C4299B-64F1-CAB8-08A0-4F46371C2658}"/>
-              </a:ext>
-            </a:extLst>
-          </p:cNvPr>
-          <p:cNvSpPr>
-            <a:spLocks noGrp="1"/>
-          </p:cNvSpPr>
-          <p:nvPr>
-            <p:ph idx="1"/>
-          </p:nvPr>
-        </p:nvSpPr>
-        <p:spPr>
-          <a:xfrm>
-            <a:off x="256674" y="855077"/>
-            <a:ext cx="7886700" cy="461665"/>
-          </a:xfrm>
-        </p:spPr>
-        <p:txBody>
-          <a:bodyPr>
-            <a:normAutofit fontScale="55000" lnSpcReduction="20000"/>
-          </a:bodyPr>
-          <a:lstStyle/>
-          <a:p>
-            <a:pPr marL="0" indent="0">
-              <a:buNone/>
-            </a:pPr>
-            <a:r>
-              <a:rPr lang="en-US" dirty="0">
-                <a:hlinkClick r:id="rId2"/>
-              </a:rPr>
-              <a:t>https://wiki.freepascal.org/Basic_Pascal_Tutorial/Chapter_1/Variables_and_Data_Types</a:t>
-            </a:r>
-            <a:endParaRPr lang="ru-RU" dirty="0">
-              <a:hlinkClick r:id="rId2"/>
-            </a:endParaRPr>
-          </a:p>
-          <a:p>
-            <a:pPr marL="0" indent="0">
-              <a:buNone/>
-            </a:pPr>
-            <a:r>
-              <a:rPr lang="en-US" dirty="0">
-                <a:hlinkClick r:id="rId2"/>
-              </a:rPr>
-              <a:t>https://www.tutorialspoint.com/pascal/pascal_variable_types.htm</a:t>
-            </a:r>
-            <a:endParaRPr lang="en-US" dirty="0"/>
-          </a:p>
-          <a:p>
-            <a:pPr marL="0" indent="0">
-              <a:buNone/>
-            </a:pPr>
-            <a:endParaRPr lang="ru-RU" dirty="0"/>
-          </a:p>
-        </p:txBody>
-      </p:sp>
-      <p:sp>
-        <p:nvSpPr>
-          <p:cNvPr id="4" name="TextBox 3">
-            <a:extLst>
-              <a:ext uri="{FF2B5EF4-FFF2-40B4-BE49-F238E27FC236}">
-                <a16:creationId xmlns:a16="http://schemas.microsoft.com/office/drawing/2014/main" id="{701CF149-D8F4-A759-2FF1-482A3E3B75A7}"/>
-              </a:ext>
-            </a:extLst>
-          </p:cNvPr>
-          <p:cNvSpPr txBox="1"/>
-          <p:nvPr/>
-        </p:nvSpPr>
-        <p:spPr>
-          <a:xfrm>
-            <a:off x="256674" y="160421"/>
-            <a:ext cx="2010487" cy="461665"/>
-          </a:xfrm>
-          <a:prstGeom prst="rect">
-            <a:avLst/>
-          </a:prstGeom>
-          <a:noFill/>
-        </p:spPr>
-        <p:txBody>
-          <a:bodyPr wrap="none" rtlCol="0">
-            <a:spAutoFit/>
-          </a:bodyPr>
-          <a:lstStyle/>
-          <a:p>
-            <a:r>
-              <a:rPr lang="ru-RU" sz="2400" dirty="0">
-                <a:effectLst/>
-                <a:latin typeface="Calibri" panose="020F0502020204030204" pitchFamily="34" charset="0"/>
-                <a:ea typeface="Calibri" panose="020F0502020204030204" pitchFamily="34" charset="0"/>
-                <a:cs typeface="Times New Roman" panose="02020603050405020304" pitchFamily="18" charset="0"/>
-              </a:rPr>
-              <a:t>Список типов.</a:t>
-            </a:r>
-            <a:endParaRPr lang="ru-RU" sz="2400" dirty="0"/>
-          </a:p>
-        </p:txBody>
-      </p:sp>
-      <p:pic>
-        <p:nvPicPr>
-          <p:cNvPr id="8" name="Рисунок 7">
-            <a:extLst>
-              <a:ext uri="{FF2B5EF4-FFF2-40B4-BE49-F238E27FC236}">
-                <a16:creationId xmlns:a16="http://schemas.microsoft.com/office/drawing/2014/main" id="{F49BBE62-C005-7792-83F2-621D84F04EA6}"/>
-              </a:ext>
-            </a:extLst>
-          </p:cNvPr>
-          <p:cNvPicPr>
-            <a:picLocks noChangeAspect="1"/>
-          </p:cNvPicPr>
-          <p:nvPr/>
-        </p:nvPicPr>
-        <p:blipFill>
-          <a:blip r:embed="rId3"/>
-          <a:stretch>
-            <a:fillRect/>
-          </a:stretch>
-        </p:blipFill>
-        <p:spPr>
-          <a:xfrm>
-            <a:off x="327109" y="1471863"/>
-            <a:ext cx="3933825" cy="3048000"/>
-          </a:xfrm>
-          <a:prstGeom prst="rect">
-            <a:avLst/>
-          </a:prstGeom>
-        </p:spPr>
-      </p:pic>
-      <p:pic>
-        <p:nvPicPr>
-          <p:cNvPr id="12" name="Рисунок 11">
-            <a:extLst>
-              <a:ext uri="{FF2B5EF4-FFF2-40B4-BE49-F238E27FC236}">
-                <a16:creationId xmlns:a16="http://schemas.microsoft.com/office/drawing/2014/main" id="{120DCBDA-B439-D9A7-DD35-AFE8B7A4B013}"/>
-              </a:ext>
-            </a:extLst>
-          </p:cNvPr>
-          <p:cNvPicPr>
-            <a:picLocks noChangeAspect="1"/>
-          </p:cNvPicPr>
-          <p:nvPr/>
-        </p:nvPicPr>
-        <p:blipFill>
-          <a:blip r:embed="rId4"/>
-          <a:stretch>
-            <a:fillRect/>
-          </a:stretch>
-        </p:blipFill>
-        <p:spPr>
-          <a:xfrm>
-            <a:off x="327109" y="4674984"/>
-            <a:ext cx="2200275" cy="1647825"/>
-          </a:xfrm>
-          <a:prstGeom prst="rect">
-            <a:avLst/>
-          </a:prstGeom>
-        </p:spPr>
-      </p:pic>
-      <p:pic>
-        <p:nvPicPr>
-          <p:cNvPr id="14" name="Рисунок 13">
-            <a:extLst>
-              <a:ext uri="{FF2B5EF4-FFF2-40B4-BE49-F238E27FC236}">
-                <a16:creationId xmlns:a16="http://schemas.microsoft.com/office/drawing/2014/main" id="{C85E162D-A508-FE81-F6AE-38B61DF3F0D5}"/>
-              </a:ext>
-            </a:extLst>
-          </p:cNvPr>
-          <p:cNvPicPr>
-            <a:picLocks noChangeAspect="1"/>
-          </p:cNvPicPr>
-          <p:nvPr/>
-        </p:nvPicPr>
-        <p:blipFill>
-          <a:blip r:embed="rId5"/>
-          <a:stretch>
-            <a:fillRect/>
-          </a:stretch>
-        </p:blipFill>
-        <p:spPr>
-          <a:xfrm>
-            <a:off x="4338637" y="1471863"/>
-            <a:ext cx="4733925" cy="2266950"/>
-          </a:xfrm>
-          <a:prstGeom prst="rect">
-            <a:avLst/>
-          </a:prstGeom>
-        </p:spPr>
-      </p:pic>
-      <p:sp>
-        <p:nvSpPr>
-          <p:cNvPr id="15" name="Номер слайда 1">
-            <a:extLst>
-              <a:ext uri="{FF2B5EF4-FFF2-40B4-BE49-F238E27FC236}">
-                <a16:creationId xmlns:a16="http://schemas.microsoft.com/office/drawing/2014/main" id="{A04C37F0-B3B5-3C98-F85A-7D61B64676FA}"/>
-              </a:ext>
-            </a:extLst>
-          </p:cNvPr>
-          <p:cNvSpPr>
-            <a:spLocks noGrp="1"/>
-          </p:cNvSpPr>
-          <p:nvPr>
-            <p:ph type="sldNum" sz="quarter" idx="12"/>
-          </p:nvPr>
-        </p:nvSpPr>
-        <p:spPr>
-          <a:xfrm>
-            <a:off x="6457950" y="6362616"/>
-            <a:ext cx="2057400" cy="365125"/>
-          </a:xfrm>
-        </p:spPr>
-        <p:txBody>
-          <a:bodyPr/>
-          <a:lstStyle/>
-          <a:p>
-            <a:fld id="{370A62FE-C268-428B-9FB6-A45FCBA79971}" type="slidenum">
-              <a:rPr lang="ru-RU" sz="1400" smtClean="0">
-                <a:solidFill>
-                  <a:schemeClr val="tx1"/>
-                </a:solidFill>
-              </a:rPr>
-              <a:t>9</a:t>
-            </a:fld>
-            <a:endParaRPr lang="ru-RU" dirty="0">
-              <a:solidFill>
-                <a:schemeClr val="tx1"/>
-              </a:solidFill>
-            </a:endParaRPr>
-          </a:p>
-        </p:txBody>
-      </p:sp>
-    </p:spTree>
-    <p:extLst>
-      <p:ext uri="{BB962C8B-B14F-4D97-AF65-F5344CB8AC3E}">
-        <p14:creationId xmlns:p14="http://schemas.microsoft.com/office/powerpoint/2010/main" val="3005760833"/>
-      </p:ext>
-    </p:extLst>
-  </p:cSld>
-  <p:clrMapOvr>
-    <a:masterClrMapping/>
-  </p:clrMapOvr>
 </p:sld>
 </file>
 

</xml_diff>